<commit_message>
Add software life cycle to the ppt
</commit_message>
<xml_diff>
--- a/presentation/Day-1/session-3.pptx
+++ b/presentation/Day-1/session-3.pptx
@@ -8,10 +8,11 @@
     <p:sldId id="256" r:id="rId2"/>
     <p:sldId id="257" r:id="rId3"/>
     <p:sldId id="258" r:id="rId4"/>
-    <p:sldId id="265" r:id="rId5"/>
-    <p:sldId id="263" r:id="rId6"/>
-    <p:sldId id="264" r:id="rId7"/>
-    <p:sldId id="262" r:id="rId8"/>
+    <p:sldId id="266" r:id="rId5"/>
+    <p:sldId id="265" r:id="rId6"/>
+    <p:sldId id="263" r:id="rId7"/>
+    <p:sldId id="264" r:id="rId8"/>
+    <p:sldId id="262" r:id="rId9"/>
   </p:sldIdLst>
   <p:sldSz cx="12192000" cy="6858000"/>
   <p:notesSz cx="6858000" cy="9144000"/>
@@ -3911,7 +3912,7 @@
             <a:pPr algn="ctr"/>
             <a:r>
               <a:rPr lang="en-IN" dirty="0"/>
-              <a:t>How do we connect?</a:t>
+              <a:t>Life cycle of software</a:t>
             </a:r>
           </a:p>
         </p:txBody>
@@ -3935,7 +3936,7 @@
         <p:spPr>
           <a:xfrm>
             <a:off x="1122967" y="2392820"/>
-            <a:ext cx="5758599" cy="2876763"/>
+            <a:ext cx="5758599" cy="3329250"/>
           </a:xfrm>
         </p:spPr>
         <p:txBody>
@@ -3946,13 +3947,37 @@
           <a:p>
             <a:r>
               <a:rPr lang="en-IN" dirty="0"/>
-              <a:t>Slack</a:t>
+              <a:t>Product Managers</a:t>
             </a:r>
           </a:p>
           <a:p>
             <a:r>
               <a:rPr lang="en-IN" dirty="0"/>
-              <a:t>I will keep posting on slack </a:t>
+              <a:t>Designers</a:t>
+            </a:r>
+          </a:p>
+          <a:p>
+            <a:r>
+              <a:rPr lang="en-IN" dirty="0"/>
+              <a:t>Developers </a:t>
+            </a:r>
+          </a:p>
+          <a:p>
+            <a:r>
+              <a:rPr lang="en-IN" dirty="0"/>
+              <a:t>Quality Control</a:t>
+            </a:r>
+          </a:p>
+          <a:p>
+            <a:r>
+              <a:rPr lang="en-IN" dirty="0"/>
+              <a:t>Release</a:t>
+            </a:r>
+          </a:p>
+          <a:p>
+            <a:r>
+              <a:rPr lang="en-IN" dirty="0"/>
+              <a:t>Analytics </a:t>
             </a:r>
           </a:p>
           <a:p>
@@ -3960,125 +3985,24 @@
           </a:p>
         </p:txBody>
       </p:sp>
-    </p:spTree>
-    <p:extLst>
-      <p:ext uri="{BB962C8B-B14F-4D97-AF65-F5344CB8AC3E}">
-        <p14:creationId xmlns:p14="http://schemas.microsoft.com/office/powerpoint/2010/main" val="3904426688"/>
-      </p:ext>
-    </p:extLst>
-  </p:cSld>
-  <p:clrMapOvr>
-    <a:masterClrMapping/>
-  </p:clrMapOvr>
-</p:sld>
-</file>
-
-<file path=ppt/slides/slide5.xml><?xml version="1.0" encoding="utf-8"?>
-<p:sld xmlns:a="http://schemas.openxmlformats.org/drawingml/2006/main" xmlns:r="http://schemas.openxmlformats.org/officeDocument/2006/relationships" xmlns:p="http://schemas.openxmlformats.org/presentationml/2006/main">
-  <p:cSld>
-    <p:spTree>
-      <p:nvGrpSpPr>
-        <p:cNvPr id="1" name=""/>
-        <p:cNvGrpSpPr/>
-        <p:nvPr/>
-      </p:nvGrpSpPr>
-      <p:grpSpPr>
-        <a:xfrm>
-          <a:off x="0" y="0"/>
-          <a:ext cx="0" cy="0"/>
-          <a:chOff x="0" y="0"/>
-          <a:chExt cx="0" cy="0"/>
-        </a:xfrm>
-      </p:grpSpPr>
-      <p:sp>
-        <p:nvSpPr>
-          <p:cNvPr id="2" name="Title 1">
-            <a:extLst>
-              <a:ext uri="{FF2B5EF4-FFF2-40B4-BE49-F238E27FC236}">
-                <a16:creationId xmlns:a16="http://schemas.microsoft.com/office/drawing/2014/main" id="{F24C21E0-28E6-834C-FA9F-FC6AB6394516}"/>
-              </a:ext>
-            </a:extLst>
-          </p:cNvPr>
-          <p:cNvSpPr>
-            <a:spLocks noGrp="1"/>
-          </p:cNvSpPr>
-          <p:nvPr>
-            <p:ph type="title"/>
-          </p:nvPr>
-        </p:nvSpPr>
-        <p:spPr/>
-        <p:txBody>
-          <a:bodyPr/>
-          <a:lstStyle/>
-          <a:p>
-            <a:pPr algn="ctr"/>
-            <a:r>
-              <a:rPr lang="en-IN" dirty="0"/>
-              <a:t>Designing a web app &amp; Android app</a:t>
-            </a:r>
-          </a:p>
-        </p:txBody>
-      </p:sp>
-      <p:sp>
-        <p:nvSpPr>
-          <p:cNvPr id="4" name="Content Placeholder 2">
-            <a:extLst>
-              <a:ext uri="{FF2B5EF4-FFF2-40B4-BE49-F238E27FC236}">
-                <a16:creationId xmlns:a16="http://schemas.microsoft.com/office/drawing/2014/main" id="{8873D759-FDB5-E798-F4A2-BEAFFF7DED28}"/>
-              </a:ext>
-            </a:extLst>
-          </p:cNvPr>
-          <p:cNvSpPr>
-            <a:spLocks noGrp="1"/>
-          </p:cNvSpPr>
-          <p:nvPr>
-            <p:ph idx="1"/>
-          </p:nvPr>
+      <p:sp>
+        <p:nvSpPr>
+          <p:cNvPr id="6" name="Content Placeholder 2">
+            <a:extLst>
+              <a:ext uri="{FF2B5EF4-FFF2-40B4-BE49-F238E27FC236}">
+                <a16:creationId xmlns:a16="http://schemas.microsoft.com/office/drawing/2014/main" id="{0304FFE0-BCFD-31B2-2EB8-0C3CD0EAA359}"/>
+              </a:ext>
+            </a:extLst>
+          </p:cNvPr>
+          <p:cNvSpPr txBox="1">
+            <a:spLocks/>
+          </p:cNvSpPr>
+          <p:nvPr/>
         </p:nvSpPr>
         <p:spPr>
           <a:xfrm>
-            <a:off x="1122968" y="2392821"/>
-            <a:ext cx="4740504" cy="1858668"/>
-          </a:xfrm>
-        </p:spPr>
-        <p:txBody>
-          <a:bodyPr/>
-          <a:lstStyle/>
-          <a:p>
-            <a:r>
-              <a:rPr lang="en-IN" dirty="0"/>
-              <a:t>Template of the website</a:t>
-            </a:r>
-          </a:p>
-          <a:p>
-            <a:r>
-              <a:rPr lang="en-IN" dirty="0"/>
-              <a:t>Functionalists </a:t>
-            </a:r>
-          </a:p>
-          <a:p>
-            <a:endParaRPr lang="en-IN" dirty="0"/>
-          </a:p>
-        </p:txBody>
-      </p:sp>
-      <p:sp>
-        <p:nvSpPr>
-          <p:cNvPr id="3" name="Content Placeholder 2">
-            <a:extLst>
-              <a:ext uri="{FF2B5EF4-FFF2-40B4-BE49-F238E27FC236}">
-                <a16:creationId xmlns:a16="http://schemas.microsoft.com/office/drawing/2014/main" id="{AB6A8D09-C459-5602-73A1-486F48F22B38}"/>
-              </a:ext>
-            </a:extLst>
-          </p:cNvPr>
-          <p:cNvSpPr txBox="1">
-            <a:spLocks/>
-          </p:cNvSpPr>
-          <p:nvPr/>
-        </p:nvSpPr>
-        <p:spPr>
-          <a:xfrm>
-            <a:off x="6096000" y="2392821"/>
-            <a:ext cx="5555530" cy="3008738"/>
+            <a:off x="7138840" y="2392821"/>
+            <a:ext cx="4666992" cy="1557010"/>
           </a:xfrm>
           <a:prstGeom prst="rect">
             <a:avLst/>
@@ -4255,14 +4179,22 @@
           <a:p>
             <a:r>
               <a:rPr lang="en-IN" dirty="0"/>
-              <a:t>Figma</a:t>
-            </a:r>
-          </a:p>
-          <a:p>
-            <a:r>
-              <a:rPr lang="en-IN" dirty="0" err="1"/>
-              <a:t>zeplin</a:t>
-            </a:r>
+              <a:t>Project Tracking Tools </a:t>
+            </a:r>
+          </a:p>
+          <a:p>
+            <a:r>
+              <a:rPr lang="en-IN" dirty="0"/>
+              <a:t>Sprints</a:t>
+            </a:r>
+          </a:p>
+          <a:p>
+            <a:r>
+              <a:rPr lang="en-IN" dirty="0"/>
+              <a:t>Jira </a:t>
+            </a:r>
+          </a:p>
+          <a:p>
             <a:endParaRPr lang="en-IN" dirty="0"/>
           </a:p>
         </p:txBody>
@@ -4270,7 +4202,110 @@
     </p:spTree>
     <p:extLst>
       <p:ext uri="{BB962C8B-B14F-4D97-AF65-F5344CB8AC3E}">
-        <p14:creationId xmlns:p14="http://schemas.microsoft.com/office/powerpoint/2010/main" val="847400251"/>
+        <p14:creationId xmlns:p14="http://schemas.microsoft.com/office/powerpoint/2010/main" val="617805317"/>
+      </p:ext>
+    </p:extLst>
+  </p:cSld>
+  <p:clrMapOvr>
+    <a:masterClrMapping/>
+  </p:clrMapOvr>
+</p:sld>
+</file>
+
+<file path=ppt/slides/slide5.xml><?xml version="1.0" encoding="utf-8"?>
+<p:sld xmlns:a="http://schemas.openxmlformats.org/drawingml/2006/main" xmlns:r="http://schemas.openxmlformats.org/officeDocument/2006/relationships" xmlns:p="http://schemas.openxmlformats.org/presentationml/2006/main">
+  <p:cSld>
+    <p:spTree>
+      <p:nvGrpSpPr>
+        <p:cNvPr id="1" name=""/>
+        <p:cNvGrpSpPr/>
+        <p:nvPr/>
+      </p:nvGrpSpPr>
+      <p:grpSpPr>
+        <a:xfrm>
+          <a:off x="0" y="0"/>
+          <a:ext cx="0" cy="0"/>
+          <a:chOff x="0" y="0"/>
+          <a:chExt cx="0" cy="0"/>
+        </a:xfrm>
+      </p:grpSpPr>
+      <p:sp>
+        <p:nvSpPr>
+          <p:cNvPr id="2" name="Title 1">
+            <a:extLst>
+              <a:ext uri="{FF2B5EF4-FFF2-40B4-BE49-F238E27FC236}">
+                <a16:creationId xmlns:a16="http://schemas.microsoft.com/office/drawing/2014/main" id="{31BA58DB-9148-15CE-6365-910B5EC177D5}"/>
+              </a:ext>
+            </a:extLst>
+          </p:cNvPr>
+          <p:cNvSpPr>
+            <a:spLocks noGrp="1"/>
+          </p:cNvSpPr>
+          <p:nvPr>
+            <p:ph type="title"/>
+          </p:nvPr>
+        </p:nvSpPr>
+        <p:spPr/>
+        <p:txBody>
+          <a:bodyPr/>
+          <a:lstStyle/>
+          <a:p>
+            <a:pPr algn="ctr"/>
+            <a:r>
+              <a:rPr lang="en-IN" dirty="0"/>
+              <a:t>How do we connect?</a:t>
+            </a:r>
+          </a:p>
+        </p:txBody>
+      </p:sp>
+      <p:sp>
+        <p:nvSpPr>
+          <p:cNvPr id="3" name="Content Placeholder 2">
+            <a:extLst>
+              <a:ext uri="{FF2B5EF4-FFF2-40B4-BE49-F238E27FC236}">
+                <a16:creationId xmlns:a16="http://schemas.microsoft.com/office/drawing/2014/main" id="{50CA1D41-4B2B-E97A-3248-068FD82282AC}"/>
+              </a:ext>
+            </a:extLst>
+          </p:cNvPr>
+          <p:cNvSpPr>
+            <a:spLocks noGrp="1"/>
+          </p:cNvSpPr>
+          <p:nvPr>
+            <p:ph idx="1"/>
+          </p:nvPr>
+        </p:nvSpPr>
+        <p:spPr>
+          <a:xfrm>
+            <a:off x="1122967" y="2392820"/>
+            <a:ext cx="5758599" cy="2876763"/>
+          </a:xfrm>
+        </p:spPr>
+        <p:txBody>
+          <a:bodyPr>
+            <a:normAutofit/>
+          </a:bodyPr>
+          <a:lstStyle/>
+          <a:p>
+            <a:r>
+              <a:rPr lang="en-IN" dirty="0"/>
+              <a:t>Slack</a:t>
+            </a:r>
+          </a:p>
+          <a:p>
+            <a:r>
+              <a:rPr lang="en-IN" dirty="0"/>
+              <a:t>I will keep posting on slack </a:t>
+            </a:r>
+          </a:p>
+          <a:p>
+            <a:endParaRPr lang="en-IN" dirty="0"/>
+          </a:p>
+        </p:txBody>
+      </p:sp>
+    </p:spTree>
+    <p:extLst>
+      <p:ext uri="{BB962C8B-B14F-4D97-AF65-F5344CB8AC3E}">
+        <p14:creationId xmlns:p14="http://schemas.microsoft.com/office/powerpoint/2010/main" val="3904426688"/>
       </p:ext>
     </p:extLst>
   </p:cSld>
@@ -4321,15 +4356,7 @@
             <a:pPr algn="ctr"/>
             <a:r>
               <a:rPr lang="en-IN" dirty="0"/>
-              <a:t>Designing an </a:t>
-            </a:r>
-            <a:r>
-              <a:rPr lang="en-IN" dirty="0" err="1"/>
-              <a:t>api</a:t>
-            </a:r>
-            <a:r>
-              <a:rPr lang="en-IN" dirty="0"/>
-              <a:t> service </a:t>
+              <a:t>Designing a web app &amp; Android app</a:t>
             </a:r>
           </a:p>
         </p:txBody>
@@ -4362,23 +4389,14 @@
           <a:p>
             <a:r>
               <a:rPr lang="en-IN" dirty="0"/>
-              <a:t>Api paths</a:t>
+              <a:t>Template of the website</a:t>
             </a:r>
           </a:p>
           <a:p>
             <a:r>
               <a:rPr lang="en-IN" dirty="0"/>
-              <a:t>User management </a:t>
-            </a:r>
-          </a:p>
-          <a:p>
-            <a:r>
-              <a:rPr lang="en-IN" dirty="0"/>
-              <a:t>Session management </a:t>
-            </a:r>
-          </a:p>
-          <a:p>
-            <a:endParaRPr lang="en-IN" dirty="0"/>
+              <a:t>Functionalists </a:t>
+            </a:r>
           </a:p>
           <a:p>
             <a:endParaRPr lang="en-IN" dirty="0"/>
@@ -4579,6 +4597,330 @@
           <a:p>
             <a:r>
               <a:rPr lang="en-IN" dirty="0"/>
+              <a:t>Figma</a:t>
+            </a:r>
+          </a:p>
+          <a:p>
+            <a:r>
+              <a:rPr lang="en-IN" dirty="0" err="1"/>
+              <a:t>zeplin</a:t>
+            </a:r>
+            <a:endParaRPr lang="en-IN" dirty="0"/>
+          </a:p>
+        </p:txBody>
+      </p:sp>
+    </p:spTree>
+    <p:extLst>
+      <p:ext uri="{BB962C8B-B14F-4D97-AF65-F5344CB8AC3E}">
+        <p14:creationId xmlns:p14="http://schemas.microsoft.com/office/powerpoint/2010/main" val="847400251"/>
+      </p:ext>
+    </p:extLst>
+  </p:cSld>
+  <p:clrMapOvr>
+    <a:masterClrMapping/>
+  </p:clrMapOvr>
+</p:sld>
+</file>
+
+<file path=ppt/slides/slide7.xml><?xml version="1.0" encoding="utf-8"?>
+<p:sld xmlns:a="http://schemas.openxmlformats.org/drawingml/2006/main" xmlns:r="http://schemas.openxmlformats.org/officeDocument/2006/relationships" xmlns:p="http://schemas.openxmlformats.org/presentationml/2006/main">
+  <p:cSld>
+    <p:spTree>
+      <p:nvGrpSpPr>
+        <p:cNvPr id="1" name=""/>
+        <p:cNvGrpSpPr/>
+        <p:nvPr/>
+      </p:nvGrpSpPr>
+      <p:grpSpPr>
+        <a:xfrm>
+          <a:off x="0" y="0"/>
+          <a:ext cx="0" cy="0"/>
+          <a:chOff x="0" y="0"/>
+          <a:chExt cx="0" cy="0"/>
+        </a:xfrm>
+      </p:grpSpPr>
+      <p:sp>
+        <p:nvSpPr>
+          <p:cNvPr id="2" name="Title 1">
+            <a:extLst>
+              <a:ext uri="{FF2B5EF4-FFF2-40B4-BE49-F238E27FC236}">
+                <a16:creationId xmlns:a16="http://schemas.microsoft.com/office/drawing/2014/main" id="{F24C21E0-28E6-834C-FA9F-FC6AB6394516}"/>
+              </a:ext>
+            </a:extLst>
+          </p:cNvPr>
+          <p:cNvSpPr>
+            <a:spLocks noGrp="1"/>
+          </p:cNvSpPr>
+          <p:nvPr>
+            <p:ph type="title"/>
+          </p:nvPr>
+        </p:nvSpPr>
+        <p:spPr/>
+        <p:txBody>
+          <a:bodyPr/>
+          <a:lstStyle/>
+          <a:p>
+            <a:pPr algn="ctr"/>
+            <a:r>
+              <a:rPr lang="en-IN" dirty="0"/>
+              <a:t>Designing an </a:t>
+            </a:r>
+            <a:r>
+              <a:rPr lang="en-IN" dirty="0" err="1"/>
+              <a:t>api</a:t>
+            </a:r>
+            <a:r>
+              <a:rPr lang="en-IN" dirty="0"/>
+              <a:t> service </a:t>
+            </a:r>
+          </a:p>
+        </p:txBody>
+      </p:sp>
+      <p:sp>
+        <p:nvSpPr>
+          <p:cNvPr id="4" name="Content Placeholder 2">
+            <a:extLst>
+              <a:ext uri="{FF2B5EF4-FFF2-40B4-BE49-F238E27FC236}">
+                <a16:creationId xmlns:a16="http://schemas.microsoft.com/office/drawing/2014/main" id="{8873D759-FDB5-E798-F4A2-BEAFFF7DED28}"/>
+              </a:ext>
+            </a:extLst>
+          </p:cNvPr>
+          <p:cNvSpPr>
+            <a:spLocks noGrp="1"/>
+          </p:cNvSpPr>
+          <p:nvPr>
+            <p:ph idx="1"/>
+          </p:nvPr>
+        </p:nvSpPr>
+        <p:spPr>
+          <a:xfrm>
+            <a:off x="1122968" y="2392821"/>
+            <a:ext cx="4740504" cy="1858668"/>
+          </a:xfrm>
+        </p:spPr>
+        <p:txBody>
+          <a:bodyPr/>
+          <a:lstStyle/>
+          <a:p>
+            <a:r>
+              <a:rPr lang="en-IN" dirty="0"/>
+              <a:t>Api paths</a:t>
+            </a:r>
+          </a:p>
+          <a:p>
+            <a:r>
+              <a:rPr lang="en-IN" dirty="0"/>
+              <a:t>User management </a:t>
+            </a:r>
+          </a:p>
+          <a:p>
+            <a:r>
+              <a:rPr lang="en-IN" dirty="0"/>
+              <a:t>Session management </a:t>
+            </a:r>
+          </a:p>
+          <a:p>
+            <a:endParaRPr lang="en-IN" dirty="0"/>
+          </a:p>
+          <a:p>
+            <a:endParaRPr lang="en-IN" dirty="0"/>
+          </a:p>
+        </p:txBody>
+      </p:sp>
+      <p:sp>
+        <p:nvSpPr>
+          <p:cNvPr id="3" name="Content Placeholder 2">
+            <a:extLst>
+              <a:ext uri="{FF2B5EF4-FFF2-40B4-BE49-F238E27FC236}">
+                <a16:creationId xmlns:a16="http://schemas.microsoft.com/office/drawing/2014/main" id="{AB6A8D09-C459-5602-73A1-486F48F22B38}"/>
+              </a:ext>
+            </a:extLst>
+          </p:cNvPr>
+          <p:cNvSpPr txBox="1">
+            <a:spLocks/>
+          </p:cNvSpPr>
+          <p:nvPr/>
+        </p:nvSpPr>
+        <p:spPr>
+          <a:xfrm>
+            <a:off x="6096000" y="2392821"/>
+            <a:ext cx="5555530" cy="3008738"/>
+          </a:xfrm>
+          <a:prstGeom prst="rect">
+            <a:avLst/>
+          </a:prstGeom>
+        </p:spPr>
+        <p:txBody>
+          <a:bodyPr vert="horz" lIns="91440" tIns="45720" rIns="91440" bIns="45720" rtlCol="0">
+            <a:normAutofit/>
+          </a:bodyPr>
+          <a:lstStyle>
+            <a:lvl1pPr marL="228600" indent="-228600" algn="l" defTabSz="914400" rtl="0" eaLnBrk="1" latinLnBrk="0" hangingPunct="1">
+              <a:lnSpc>
+                <a:spcPct val="90000"/>
+              </a:lnSpc>
+              <a:spcBef>
+                <a:spcPts val="1000"/>
+              </a:spcBef>
+              <a:buFont typeface="Arial" panose="020B0604020202020204" pitchFamily="34" charset="0"/>
+              <a:buChar char="•"/>
+              <a:defRPr sz="2800" kern="1200">
+                <a:solidFill>
+                  <a:schemeClr val="tx1"/>
+                </a:solidFill>
+                <a:latin typeface="+mn-lt"/>
+                <a:ea typeface="+mn-ea"/>
+                <a:cs typeface="+mn-cs"/>
+              </a:defRPr>
+            </a:lvl1pPr>
+            <a:lvl2pPr marL="685800" indent="-228600" algn="l" defTabSz="914400" rtl="0" eaLnBrk="1" latinLnBrk="0" hangingPunct="1">
+              <a:lnSpc>
+                <a:spcPct val="90000"/>
+              </a:lnSpc>
+              <a:spcBef>
+                <a:spcPts val="500"/>
+              </a:spcBef>
+              <a:buFont typeface="Arial" panose="020B0604020202020204" pitchFamily="34" charset="0"/>
+              <a:buChar char="•"/>
+              <a:defRPr sz="2400" kern="1200">
+                <a:solidFill>
+                  <a:schemeClr val="tx1"/>
+                </a:solidFill>
+                <a:latin typeface="+mn-lt"/>
+                <a:ea typeface="+mn-ea"/>
+                <a:cs typeface="+mn-cs"/>
+              </a:defRPr>
+            </a:lvl2pPr>
+            <a:lvl3pPr marL="1143000" indent="-228600" algn="l" defTabSz="914400" rtl="0" eaLnBrk="1" latinLnBrk="0" hangingPunct="1">
+              <a:lnSpc>
+                <a:spcPct val="90000"/>
+              </a:lnSpc>
+              <a:spcBef>
+                <a:spcPts val="500"/>
+              </a:spcBef>
+              <a:buFont typeface="Arial" panose="020B0604020202020204" pitchFamily="34" charset="0"/>
+              <a:buChar char="•"/>
+              <a:defRPr sz="2000" kern="1200">
+                <a:solidFill>
+                  <a:schemeClr val="tx1"/>
+                </a:solidFill>
+                <a:latin typeface="+mn-lt"/>
+                <a:ea typeface="+mn-ea"/>
+                <a:cs typeface="+mn-cs"/>
+              </a:defRPr>
+            </a:lvl3pPr>
+            <a:lvl4pPr marL="1600200" indent="-228600" algn="l" defTabSz="914400" rtl="0" eaLnBrk="1" latinLnBrk="0" hangingPunct="1">
+              <a:lnSpc>
+                <a:spcPct val="90000"/>
+              </a:lnSpc>
+              <a:spcBef>
+                <a:spcPts val="500"/>
+              </a:spcBef>
+              <a:buFont typeface="Arial" panose="020B0604020202020204" pitchFamily="34" charset="0"/>
+              <a:buChar char="•"/>
+              <a:defRPr sz="1800" kern="1200">
+                <a:solidFill>
+                  <a:schemeClr val="tx1"/>
+                </a:solidFill>
+                <a:latin typeface="+mn-lt"/>
+                <a:ea typeface="+mn-ea"/>
+                <a:cs typeface="+mn-cs"/>
+              </a:defRPr>
+            </a:lvl4pPr>
+            <a:lvl5pPr marL="2057400" indent="-228600" algn="l" defTabSz="914400" rtl="0" eaLnBrk="1" latinLnBrk="0" hangingPunct="1">
+              <a:lnSpc>
+                <a:spcPct val="90000"/>
+              </a:lnSpc>
+              <a:spcBef>
+                <a:spcPts val="500"/>
+              </a:spcBef>
+              <a:buFont typeface="Arial" panose="020B0604020202020204" pitchFamily="34" charset="0"/>
+              <a:buChar char="•"/>
+              <a:defRPr sz="1800" kern="1200">
+                <a:solidFill>
+                  <a:schemeClr val="tx1"/>
+                </a:solidFill>
+                <a:latin typeface="+mn-lt"/>
+                <a:ea typeface="+mn-ea"/>
+                <a:cs typeface="+mn-cs"/>
+              </a:defRPr>
+            </a:lvl5pPr>
+            <a:lvl6pPr marL="2514600" indent="-228600" algn="l" defTabSz="914400" rtl="0" eaLnBrk="1" latinLnBrk="0" hangingPunct="1">
+              <a:lnSpc>
+                <a:spcPct val="90000"/>
+              </a:lnSpc>
+              <a:spcBef>
+                <a:spcPts val="500"/>
+              </a:spcBef>
+              <a:buFont typeface="Arial" panose="020B0604020202020204" pitchFamily="34" charset="0"/>
+              <a:buChar char="•"/>
+              <a:defRPr sz="1800" kern="1200">
+                <a:solidFill>
+                  <a:schemeClr val="tx1"/>
+                </a:solidFill>
+                <a:latin typeface="+mn-lt"/>
+                <a:ea typeface="+mn-ea"/>
+                <a:cs typeface="+mn-cs"/>
+              </a:defRPr>
+            </a:lvl6pPr>
+            <a:lvl7pPr marL="2971800" indent="-228600" algn="l" defTabSz="914400" rtl="0" eaLnBrk="1" latinLnBrk="0" hangingPunct="1">
+              <a:lnSpc>
+                <a:spcPct val="90000"/>
+              </a:lnSpc>
+              <a:spcBef>
+                <a:spcPts val="500"/>
+              </a:spcBef>
+              <a:buFont typeface="Arial" panose="020B0604020202020204" pitchFamily="34" charset="0"/>
+              <a:buChar char="•"/>
+              <a:defRPr sz="1800" kern="1200">
+                <a:solidFill>
+                  <a:schemeClr val="tx1"/>
+                </a:solidFill>
+                <a:latin typeface="+mn-lt"/>
+                <a:ea typeface="+mn-ea"/>
+                <a:cs typeface="+mn-cs"/>
+              </a:defRPr>
+            </a:lvl7pPr>
+            <a:lvl8pPr marL="3429000" indent="-228600" algn="l" defTabSz="914400" rtl="0" eaLnBrk="1" latinLnBrk="0" hangingPunct="1">
+              <a:lnSpc>
+                <a:spcPct val="90000"/>
+              </a:lnSpc>
+              <a:spcBef>
+                <a:spcPts val="500"/>
+              </a:spcBef>
+              <a:buFont typeface="Arial" panose="020B0604020202020204" pitchFamily="34" charset="0"/>
+              <a:buChar char="•"/>
+              <a:defRPr sz="1800" kern="1200">
+                <a:solidFill>
+                  <a:schemeClr val="tx1"/>
+                </a:solidFill>
+                <a:latin typeface="+mn-lt"/>
+                <a:ea typeface="+mn-ea"/>
+                <a:cs typeface="+mn-cs"/>
+              </a:defRPr>
+            </a:lvl8pPr>
+            <a:lvl9pPr marL="3886200" indent="-228600" algn="l" defTabSz="914400" rtl="0" eaLnBrk="1" latinLnBrk="0" hangingPunct="1">
+              <a:lnSpc>
+                <a:spcPct val="90000"/>
+              </a:lnSpc>
+              <a:spcBef>
+                <a:spcPts val="500"/>
+              </a:spcBef>
+              <a:buFont typeface="Arial" panose="020B0604020202020204" pitchFamily="34" charset="0"/>
+              <a:buChar char="•"/>
+              <a:defRPr sz="1800" kern="1200">
+                <a:solidFill>
+                  <a:schemeClr val="tx1"/>
+                </a:solidFill>
+                <a:latin typeface="+mn-lt"/>
+                <a:ea typeface="+mn-ea"/>
+                <a:cs typeface="+mn-cs"/>
+              </a:defRPr>
+            </a:lvl9pPr>
+          </a:lstStyle>
+          <a:p>
+            <a:r>
+              <a:rPr lang="en-IN" dirty="0"/>
               <a:t>Defining schema </a:t>
             </a:r>
           </a:p>
@@ -4603,7 +4945,7 @@
 </p:sld>
 </file>
 
-<file path=ppt/slides/slide7.xml><?xml version="1.0" encoding="utf-8"?>
+<file path=ppt/slides/slide8.xml><?xml version="1.0" encoding="utf-8"?>
 <p:sld xmlns:a="http://schemas.openxmlformats.org/drawingml/2006/main" xmlns:r="http://schemas.openxmlformats.org/officeDocument/2006/relationships" xmlns:p="http://schemas.openxmlformats.org/presentationml/2006/main">
   <p:cSld>
     <p:spTree>

</xml_diff>